<commit_message>
fixing autoscaling to treat missing as not breaching and fixing presentaion typos
</commit_message>
<xml_diff>
--- a/Reactive_microservices_aws_PUBLIC.pptx
+++ b/Reactive_microservices_aws_PUBLIC.pptx
@@ -10601,7 +10601,7 @@
                   <a:srgbClr val="58DEEC"/>
                 </a:solidFill>
               </a:rPr>
-              <a:t>What are these features important?</a:t>
+              <a:t>Why are these features important?</a:t>
             </a:r>
           </a:p>
         </p:txBody>
@@ -10783,7 +10783,7 @@
                   <a:srgbClr val="58DEEC"/>
                 </a:solidFill>
               </a:rPr>
-              <a:t>What are these features important?</a:t>
+              <a:t>Why are these features important?</a:t>
             </a:r>
           </a:p>
         </p:txBody>
@@ -11011,7 +11011,7 @@
                   <a:srgbClr val="58DEEC"/>
                 </a:solidFill>
               </a:rPr>
-              <a:t>What are these features important?</a:t>
+              <a:t>Why are these features important?</a:t>
             </a:r>
           </a:p>
         </p:txBody>
@@ -11223,7 +11223,7 @@
                   <a:srgbClr val="58DEEC"/>
                 </a:solidFill>
               </a:rPr>
-              <a:t>What are these features important?</a:t>
+              <a:t>Why are these features important?</a:t>
             </a:r>
           </a:p>
         </p:txBody>

</xml_diff>